<commit_message>
Looks like video changes
</commit_message>
<xml_diff>
--- a/Video/ActiveArea Slider with labels.pptx
+++ b/Video/ActiveArea Slider with labels.pptx
@@ -192,7 +192,7 @@
           <a:p>
             <a:fld id="{3C6252BD-48BA-48A3-AC51-45A442831B77}" type="datetimeFigureOut">
               <a:rPr lang="en-US" smtClean="0"/>
-              <a:t>9/17/2012</a:t>
+              <a:t>9/19/2012</a:t>
             </a:fld>
             <a:endParaRPr lang="en-US"/>
           </a:p>
@@ -641,7 +641,7 @@
           <a:p>
             <a:fld id="{F1EBCD4B-1E7B-4862-8DE9-250E3AE47FBD}" type="datetimeFigureOut">
               <a:rPr lang="en-US" smtClean="0"/>
-              <a:t>9/17/2012</a:t>
+              <a:t>9/19/2012</a:t>
             </a:fld>
             <a:endParaRPr lang="en-US"/>
           </a:p>
@@ -811,7 +811,7 @@
           <a:p>
             <a:fld id="{F1EBCD4B-1E7B-4862-8DE9-250E3AE47FBD}" type="datetimeFigureOut">
               <a:rPr lang="en-US" smtClean="0"/>
-              <a:t>9/17/2012</a:t>
+              <a:t>9/19/2012</a:t>
             </a:fld>
             <a:endParaRPr lang="en-US"/>
           </a:p>
@@ -991,7 +991,7 @@
           <a:p>
             <a:fld id="{F1EBCD4B-1E7B-4862-8DE9-250E3AE47FBD}" type="datetimeFigureOut">
               <a:rPr lang="en-US" smtClean="0"/>
-              <a:t>9/17/2012</a:t>
+              <a:t>9/19/2012</a:t>
             </a:fld>
             <a:endParaRPr lang="en-US"/>
           </a:p>
@@ -1161,7 +1161,7 @@
           <a:p>
             <a:fld id="{F1EBCD4B-1E7B-4862-8DE9-250E3AE47FBD}" type="datetimeFigureOut">
               <a:rPr lang="en-US" smtClean="0"/>
-              <a:t>9/17/2012</a:t>
+              <a:t>9/19/2012</a:t>
             </a:fld>
             <a:endParaRPr lang="en-US"/>
           </a:p>
@@ -1407,7 +1407,7 @@
           <a:p>
             <a:fld id="{F1EBCD4B-1E7B-4862-8DE9-250E3AE47FBD}" type="datetimeFigureOut">
               <a:rPr lang="en-US" smtClean="0"/>
-              <a:t>9/17/2012</a:t>
+              <a:t>9/19/2012</a:t>
             </a:fld>
             <a:endParaRPr lang="en-US"/>
           </a:p>
@@ -1695,7 +1695,7 @@
           <a:p>
             <a:fld id="{F1EBCD4B-1E7B-4862-8DE9-250E3AE47FBD}" type="datetimeFigureOut">
               <a:rPr lang="en-US" smtClean="0"/>
-              <a:t>9/17/2012</a:t>
+              <a:t>9/19/2012</a:t>
             </a:fld>
             <a:endParaRPr lang="en-US"/>
           </a:p>
@@ -2117,7 +2117,7 @@
           <a:p>
             <a:fld id="{F1EBCD4B-1E7B-4862-8DE9-250E3AE47FBD}" type="datetimeFigureOut">
               <a:rPr lang="en-US" smtClean="0"/>
-              <a:t>9/17/2012</a:t>
+              <a:t>9/19/2012</a:t>
             </a:fld>
             <a:endParaRPr lang="en-US"/>
           </a:p>
@@ -2235,7 +2235,7 @@
           <a:p>
             <a:fld id="{F1EBCD4B-1E7B-4862-8DE9-250E3AE47FBD}" type="datetimeFigureOut">
               <a:rPr lang="en-US" smtClean="0"/>
-              <a:t>9/17/2012</a:t>
+              <a:t>9/19/2012</a:t>
             </a:fld>
             <a:endParaRPr lang="en-US"/>
           </a:p>
@@ -2330,7 +2330,7 @@
           <a:p>
             <a:fld id="{F1EBCD4B-1E7B-4862-8DE9-250E3AE47FBD}" type="datetimeFigureOut">
               <a:rPr lang="en-US" smtClean="0"/>
-              <a:t>9/17/2012</a:t>
+              <a:t>9/19/2012</a:t>
             </a:fld>
             <a:endParaRPr lang="en-US"/>
           </a:p>
@@ -2607,7 +2607,7 @@
           <a:p>
             <a:fld id="{F1EBCD4B-1E7B-4862-8DE9-250E3AE47FBD}" type="datetimeFigureOut">
               <a:rPr lang="en-US" smtClean="0"/>
-              <a:t>9/17/2012</a:t>
+              <a:t>9/19/2012</a:t>
             </a:fld>
             <a:endParaRPr lang="en-US"/>
           </a:p>
@@ -2860,7 +2860,7 @@
           <a:p>
             <a:fld id="{F1EBCD4B-1E7B-4862-8DE9-250E3AE47FBD}" type="datetimeFigureOut">
               <a:rPr lang="en-US" smtClean="0"/>
-              <a:t>9/17/2012</a:t>
+              <a:t>9/19/2012</a:t>
             </a:fld>
             <a:endParaRPr lang="en-US"/>
           </a:p>
@@ -3073,7 +3073,7 @@
           <a:p>
             <a:fld id="{F1EBCD4B-1E7B-4862-8DE9-250E3AE47FBD}" type="datetimeFigureOut">
               <a:rPr lang="en-US" smtClean="0"/>
-              <a:t>9/17/2012</a:t>
+              <a:t>9/19/2012</a:t>
             </a:fld>
             <a:endParaRPr lang="en-US"/>
           </a:p>
@@ -3456,8 +3456,8 @@
         </p:nvGrpSpPr>
         <p:grpSpPr>
           <a:xfrm>
-            <a:off x="990600" y="1752600"/>
-            <a:ext cx="6764867" cy="2198132"/>
+            <a:off x="930135" y="1616159"/>
+            <a:ext cx="6900076" cy="2242066"/>
             <a:chOff x="990600" y="1752600"/>
             <a:chExt cx="6764867" cy="2198132"/>
           </a:xfrm>

</xml_diff>